<commit_message>
dataflow & producer slides
</commit_message>
<xml_diff>
--- a/Presentation.pptx
+++ b/Presentation.pptx
@@ -5,10 +5,10 @@
     <p:sldMasterId id="2147483648" r:id="rId4"/>
   </p:sldMasterIdLst>
   <p:notesMasterIdLst>
-    <p:notesMasterId r:id="rId13"/>
+    <p:notesMasterId r:id="rId14"/>
   </p:notesMasterIdLst>
   <p:handoutMasterIdLst>
-    <p:handoutMasterId r:id="rId14"/>
+    <p:handoutMasterId r:id="rId15"/>
   </p:handoutMasterIdLst>
   <p:sldIdLst>
     <p:sldId id="256" r:id="rId5"/>
@@ -17,8 +17,9 @@
     <p:sldId id="260" r:id="rId8"/>
     <p:sldId id="269" r:id="rId9"/>
     <p:sldId id="262" r:id="rId10"/>
-    <p:sldId id="271" r:id="rId11"/>
-    <p:sldId id="264" r:id="rId12"/>
+    <p:sldId id="272" r:id="rId11"/>
+    <p:sldId id="271" r:id="rId12"/>
+    <p:sldId id="264" r:id="rId13"/>
   </p:sldIdLst>
   <p:sldSz cx="12192000" cy="6858000"/>
   <p:notesSz cx="6858000" cy="9144000"/>
@@ -238,7 +239,7 @@
           <a:p>
             <a:fld id="{872BFC85-49E4-447A-A7E3-16153CB2FE2A}" type="datetimeFigureOut">
               <a:rPr lang="en-US" smtClean="0"/>
-              <a:t>5/19/19</a:t>
+              <a:t>5/20/2019</a:t>
             </a:fld>
             <a:endParaRPr lang="en-US" dirty="0"/>
           </a:p>
@@ -415,7 +416,7 @@
           <a:p>
             <a:fld id="{1071B50E-4C60-4F9E-B773-52059170945B}" type="datetimeFigureOut">
               <a:rPr lang="en-US" noProof="0" smtClean="0"/>
-              <a:t>5/19/19</a:t>
+              <a:t>5/20/2019</a:t>
             </a:fld>
             <a:endParaRPr lang="en-US" noProof="0" dirty="0"/>
           </a:p>
@@ -1124,7 +1125,7 @@
   <p:clrMapOvr>
     <a:masterClrMapping/>
   </p:clrMapOvr>
-  <p:extLst mod="1">
+  <p:extLst>
     <p:ext uri="{DCECCB84-F9BA-43D5-87BE-67443E8EF086}">
       <p15:sldGuideLst xmlns:p15="http://schemas.microsoft.com/office/powerpoint/2012/main">
         <p15:guide id="1" orient="horz" pos="2160" userDrawn="1">
@@ -1503,7 +1504,7 @@
   <p:clrMapOvr>
     <a:masterClrMapping/>
   </p:clrMapOvr>
-  <p:extLst mod="1">
+  <p:extLst>
     <p:ext uri="{DCECCB84-F9BA-43D5-87BE-67443E8EF086}">
       <p15:sldGuideLst xmlns:p15="http://schemas.microsoft.com/office/powerpoint/2012/main">
         <p15:guide id="1" orient="horz" pos="2160">
@@ -2147,7 +2148,7 @@
   <p:clrMapOvr>
     <a:masterClrMapping/>
   </p:clrMapOvr>
-  <p:extLst mod="1">
+  <p:extLst>
     <p:ext uri="{DCECCB84-F9BA-43D5-87BE-67443E8EF086}">
       <p15:sldGuideLst xmlns:p15="http://schemas.microsoft.com/office/powerpoint/2012/main">
         <p15:guide id="1" orient="horz" pos="2183">
@@ -2756,7 +2757,7 @@
   <p:clrMapOvr>
     <a:masterClrMapping/>
   </p:clrMapOvr>
-  <p:extLst mod="1">
+  <p:extLst>
     <p:ext uri="{DCECCB84-F9BA-43D5-87BE-67443E8EF086}">
       <p15:sldGuideLst xmlns:p15="http://schemas.microsoft.com/office/powerpoint/2012/main">
         <p15:guide id="1" orient="horz" pos="2160">
@@ -3476,7 +3477,7 @@
   <p:clrMapOvr>
     <a:masterClrMapping/>
   </p:clrMapOvr>
-  <p:extLst mod="1">
+  <p:extLst>
     <p:ext uri="{DCECCB84-F9BA-43D5-87BE-67443E8EF086}">
       <p15:sldGuideLst xmlns:p15="http://schemas.microsoft.com/office/powerpoint/2012/main">
         <p15:guide id="1" orient="horz" pos="2160">
@@ -4320,7 +4321,7 @@
   <p:clrMapOvr>
     <a:masterClrMapping/>
   </p:clrMapOvr>
-  <p:extLst mod="1">
+  <p:extLst>
     <p:ext uri="{DCECCB84-F9BA-43D5-87BE-67443E8EF086}">
       <p15:sldGuideLst xmlns:p15="http://schemas.microsoft.com/office/powerpoint/2012/main">
         <p15:guide id="1" orient="horz" pos="2160">
@@ -4799,7 +4800,7 @@
   <p:clrMapOvr>
     <a:masterClrMapping/>
   </p:clrMapOvr>
-  <p:extLst mod="1">
+  <p:extLst>
     <p:ext uri="{DCECCB84-F9BA-43D5-87BE-67443E8EF086}">
       <p15:sldGuideLst xmlns:p15="http://schemas.microsoft.com/office/powerpoint/2012/main">
         <p15:guide id="1" orient="horz" pos="2160">
@@ -5254,7 +5255,7 @@
   <p:clrMapOvr>
     <a:masterClrMapping/>
   </p:clrMapOvr>
-  <p:extLst mod="1">
+  <p:extLst>
     <p:ext uri="{DCECCB84-F9BA-43D5-87BE-67443E8EF086}">
       <p15:sldGuideLst xmlns:p15="http://schemas.microsoft.com/office/powerpoint/2012/main">
         <p15:guide id="1" orient="horz" pos="2160">
@@ -5659,7 +5660,7 @@
   <p:clrMapOvr>
     <a:masterClrMapping/>
   </p:clrMapOvr>
-  <p:extLst mod="1">
+  <p:extLst>
     <p:ext uri="{DCECCB84-F9BA-43D5-87BE-67443E8EF086}">
       <p15:sldGuideLst xmlns:p15="http://schemas.microsoft.com/office/powerpoint/2012/main">
         <p15:guide id="1" orient="horz" pos="142">
@@ -6090,7 +6091,7 @@
   <p:clrMapOvr>
     <a:masterClrMapping/>
   </p:clrMapOvr>
-  <p:extLst mod="1">
+  <p:extLst>
     <p:ext uri="{DCECCB84-F9BA-43D5-87BE-67443E8EF086}">
       <p15:sldGuideLst xmlns:p15="http://schemas.microsoft.com/office/powerpoint/2012/main">
         <p15:guide id="1" orient="horz" pos="142">
@@ -6882,7 +6883,7 @@
   <p:clrMapOvr>
     <a:masterClrMapping/>
   </p:clrMapOvr>
-  <p:extLst mod="1">
+  <p:extLst>
     <p:ext uri="{DCECCB84-F9BA-43D5-87BE-67443E8EF086}">
       <p15:sldGuideLst xmlns:p15="http://schemas.microsoft.com/office/powerpoint/2012/main">
         <p15:guide id="1" orient="horz" pos="2183" userDrawn="1">
@@ -7575,7 +7576,7 @@
   <p:clrMapOvr>
     <a:masterClrMapping/>
   </p:clrMapOvr>
-  <p:extLst mod="1">
+  <p:extLst>
     <p:ext uri="{DCECCB84-F9BA-43D5-87BE-67443E8EF086}">
       <p15:sldGuideLst xmlns:p15="http://schemas.microsoft.com/office/powerpoint/2012/main">
         <p15:guide id="1" orient="horz" pos="142">
@@ -8186,7 +8187,7 @@
   <p:clrMapOvr>
     <a:masterClrMapping/>
   </p:clrMapOvr>
-  <p:extLst mod="1">
+  <p:extLst>
     <p:ext uri="{DCECCB84-F9BA-43D5-87BE-67443E8EF086}">
       <p15:sldGuideLst xmlns:p15="http://schemas.microsoft.com/office/powerpoint/2012/main">
         <p15:guide id="1" orient="horz" pos="142">
@@ -9129,7 +9130,7 @@
   <p:clrMapOvr>
     <a:masterClrMapping/>
   </p:clrMapOvr>
-  <p:extLst mod="1">
+  <p:extLst>
     <p:ext uri="{DCECCB84-F9BA-43D5-87BE-67443E8EF086}">
       <p15:sldGuideLst xmlns:p15="http://schemas.microsoft.com/office/powerpoint/2012/main">
         <p15:guide id="1" orient="horz" pos="2160">
@@ -9749,7 +9750,7 @@
   <p:clrMapOvr>
     <a:masterClrMapping/>
   </p:clrMapOvr>
-  <p:extLst mod="1">
+  <p:extLst>
     <p:ext uri="{DCECCB84-F9BA-43D5-87BE-67443E8EF086}">
       <p15:sldGuideLst xmlns:p15="http://schemas.microsoft.com/office/powerpoint/2012/main">
         <p15:guide id="1" orient="horz" pos="142">
@@ -10280,7 +10281,7 @@
   <p:clrMapOvr>
     <a:masterClrMapping/>
   </p:clrMapOvr>
-  <p:extLst mod="1">
+  <p:extLst>
     <p:ext uri="{DCECCB84-F9BA-43D5-87BE-67443E8EF086}">
       <p15:sldGuideLst xmlns:p15="http://schemas.microsoft.com/office/powerpoint/2012/main">
         <p15:guide id="1" orient="horz" pos="142">
@@ -10528,7 +10529,7 @@
   <p:clrMapOvr>
     <a:masterClrMapping/>
   </p:clrMapOvr>
-  <p:extLst mod="1">
+  <p:extLst>
     <p:ext uri="{DCECCB84-F9BA-43D5-87BE-67443E8EF086}">
       <p15:sldGuideLst xmlns:p15="http://schemas.microsoft.com/office/powerpoint/2012/main">
         <p15:guide id="1" orient="horz" pos="2160" userDrawn="1">
@@ -12416,7 +12417,7 @@
   <p:clrMapOvr>
     <a:masterClrMapping/>
   </p:clrMapOvr>
-  <p:extLst mod="1">
+  <p:extLst>
     <p:ext uri="{DCECCB84-F9BA-43D5-87BE-67443E8EF086}">
       <p15:sldGuideLst xmlns:p15="http://schemas.microsoft.com/office/powerpoint/2012/main">
         <p15:guide id="1" orient="horz" pos="2160">
@@ -14505,7 +14506,7 @@
           <p:cNvPr id="2" name="Title 1">
             <a:extLst>
               <a:ext uri="{FF2B5EF4-FFF2-40B4-BE49-F238E27FC236}">
-                <a16:creationId xmlns:a16="http://schemas.microsoft.com/office/drawing/2014/main" id="{A6E098CB-2AD7-4541-BC90-8FCF56060041}"/>
+                <a16:creationId xmlns:a16="http://schemas.microsoft.com/office/drawing/2014/main" id="{5896A5A3-91E5-4540-8701-AF42C0EDC93E}"/>
               </a:ext>
             </a:extLst>
           </p:cNvPr>
@@ -14523,8 +14524,9 @@
           <a:p>
             <a:r>
               <a:rPr lang="en-US" dirty="0"/>
-              <a:t>Cart Producer</a:t>
-            </a:r>
+              <a:t>Data flow</a:t>
+            </a:r>
+            <a:endParaRPr lang="en-GB" dirty="0"/>
           </a:p>
         </p:txBody>
       </p:sp>
@@ -14533,7 +14535,7 @@
           <p:cNvPr id="3" name="Footer Placeholder 2">
             <a:extLst>
               <a:ext uri="{FF2B5EF4-FFF2-40B4-BE49-F238E27FC236}">
-                <a16:creationId xmlns:a16="http://schemas.microsoft.com/office/drawing/2014/main" id="{AACB0A2C-4D94-B041-89D6-8322F8E87E8D}"/>
+                <a16:creationId xmlns:a16="http://schemas.microsoft.com/office/drawing/2014/main" id="{69FF922E-572C-498C-82EE-7092C1804838}"/>
               </a:ext>
             </a:extLst>
           </p:cNvPr>
@@ -14562,7 +14564,7 @@
           <p:cNvPr id="4" name="Slide Number Placeholder 3">
             <a:extLst>
               <a:ext uri="{FF2B5EF4-FFF2-40B4-BE49-F238E27FC236}">
-                <a16:creationId xmlns:a16="http://schemas.microsoft.com/office/drawing/2014/main" id="{B24F5695-E14A-294F-85B4-1AF9CA76A11D}"/>
+                <a16:creationId xmlns:a16="http://schemas.microsoft.com/office/drawing/2014/main" id="{47897AAE-69A3-4931-A330-BF373A1D8ADB}"/>
               </a:ext>
             </a:extLst>
           </p:cNvPr>
@@ -14583,6 +14585,1059 @@
               <a:t>7</a:t>
             </a:fld>
             <a:endParaRPr lang="en-US" noProof="0" dirty="0"/>
+          </a:p>
+        </p:txBody>
+      </p:sp>
+      <p:pic>
+        <p:nvPicPr>
+          <p:cNvPr id="6" name="Picture 5">
+            <a:extLst>
+              <a:ext uri="{FF2B5EF4-FFF2-40B4-BE49-F238E27FC236}">
+                <a16:creationId xmlns:a16="http://schemas.microsoft.com/office/drawing/2014/main" id="{95EB41E6-71CF-448B-B026-D41ADE5E6640}"/>
+              </a:ext>
+            </a:extLst>
+          </p:cNvPr>
+          <p:cNvPicPr>
+            <a:picLocks noChangeAspect="1"/>
+          </p:cNvPicPr>
+          <p:nvPr/>
+        </p:nvPicPr>
+        <p:blipFill>
+          <a:blip r:embed="rId2"/>
+          <a:stretch>
+            <a:fillRect/>
+          </a:stretch>
+        </p:blipFill>
+        <p:spPr>
+          <a:xfrm>
+            <a:off x="518678" y="1424594"/>
+            <a:ext cx="2062632" cy="2062632"/>
+          </a:xfrm>
+          <a:prstGeom prst="rect">
+            <a:avLst/>
+          </a:prstGeom>
+        </p:spPr>
+      </p:pic>
+      <p:sp>
+        <p:nvSpPr>
+          <p:cNvPr id="7" name="TextBox 6">
+            <a:extLst>
+              <a:ext uri="{FF2B5EF4-FFF2-40B4-BE49-F238E27FC236}">
+                <a16:creationId xmlns:a16="http://schemas.microsoft.com/office/drawing/2014/main" id="{81D853A5-2A33-429F-94C0-7DDBB20A3395}"/>
+              </a:ext>
+            </a:extLst>
+          </p:cNvPr>
+          <p:cNvSpPr txBox="1"/>
+          <p:nvPr/>
+        </p:nvSpPr>
+        <p:spPr>
+          <a:xfrm>
+            <a:off x="743965" y="3487226"/>
+            <a:ext cx="1837345" cy="646331"/>
+          </a:xfrm>
+          <a:prstGeom prst="rect">
+            <a:avLst/>
+          </a:prstGeom>
+          <a:noFill/>
+        </p:spPr>
+        <p:txBody>
+          <a:bodyPr wrap="square" rtlCol="0">
+            <a:spAutoFit/>
+          </a:bodyPr>
+          <a:lstStyle/>
+          <a:p>
+            <a:r>
+              <a:rPr lang="en-US" dirty="0"/>
+              <a:t>E-commerce, Mortgage, ERP …</a:t>
+            </a:r>
+            <a:endParaRPr lang="en-GB" dirty="0"/>
+          </a:p>
+        </p:txBody>
+      </p:sp>
+      <p:pic>
+        <p:nvPicPr>
+          <p:cNvPr id="17" name="Picture 16">
+            <a:extLst>
+              <a:ext uri="{FF2B5EF4-FFF2-40B4-BE49-F238E27FC236}">
+                <a16:creationId xmlns:a16="http://schemas.microsoft.com/office/drawing/2014/main" id="{4DB8986E-4EAC-4C8C-8A8A-539690F11106}"/>
+              </a:ext>
+            </a:extLst>
+          </p:cNvPr>
+          <p:cNvPicPr>
+            <a:picLocks noChangeAspect="1"/>
+          </p:cNvPicPr>
+          <p:nvPr/>
+        </p:nvPicPr>
+        <p:blipFill>
+          <a:blip r:embed="rId3"/>
+          <a:stretch>
+            <a:fillRect/>
+          </a:stretch>
+        </p:blipFill>
+        <p:spPr>
+          <a:xfrm>
+            <a:off x="3510473" y="2030223"/>
+            <a:ext cx="942857" cy="514286"/>
+          </a:xfrm>
+          <a:prstGeom prst="rect">
+            <a:avLst/>
+          </a:prstGeom>
+        </p:spPr>
+      </p:pic>
+      <p:sp>
+        <p:nvSpPr>
+          <p:cNvPr id="18" name="Arrow: Right 17">
+            <a:extLst>
+              <a:ext uri="{FF2B5EF4-FFF2-40B4-BE49-F238E27FC236}">
+                <a16:creationId xmlns:a16="http://schemas.microsoft.com/office/drawing/2014/main" id="{00AE79D9-6DFD-4F2A-B9E0-345302288F73}"/>
+              </a:ext>
+            </a:extLst>
+          </p:cNvPr>
+          <p:cNvSpPr/>
+          <p:nvPr/>
+        </p:nvSpPr>
+        <p:spPr>
+          <a:xfrm>
+            <a:off x="2716697" y="2186609"/>
+            <a:ext cx="621676" cy="238538"/>
+          </a:xfrm>
+          <a:prstGeom prst="rightArrow">
+            <a:avLst/>
+          </a:prstGeom>
+        </p:spPr>
+        <p:style>
+          <a:lnRef idx="2">
+            <a:schemeClr val="accent1">
+              <a:shade val="50000"/>
+            </a:schemeClr>
+          </a:lnRef>
+          <a:fillRef idx="1">
+            <a:schemeClr val="accent1"/>
+          </a:fillRef>
+          <a:effectRef idx="0">
+            <a:schemeClr val="accent1"/>
+          </a:effectRef>
+          <a:fontRef idx="minor">
+            <a:schemeClr val="lt1"/>
+          </a:fontRef>
+        </p:style>
+        <p:txBody>
+          <a:bodyPr rtlCol="0" anchor="ctr"/>
+          <a:lstStyle/>
+          <a:p>
+            <a:pPr algn="ctr"/>
+            <a:endParaRPr lang="en-GB"/>
+          </a:p>
+        </p:txBody>
+      </p:sp>
+      <p:sp>
+        <p:nvSpPr>
+          <p:cNvPr id="19" name="TextBox 18">
+            <a:extLst>
+              <a:ext uri="{FF2B5EF4-FFF2-40B4-BE49-F238E27FC236}">
+                <a16:creationId xmlns:a16="http://schemas.microsoft.com/office/drawing/2014/main" id="{81F65357-154E-476B-820D-451545E06746}"/>
+              </a:ext>
+            </a:extLst>
+          </p:cNvPr>
+          <p:cNvSpPr txBox="1"/>
+          <p:nvPr/>
+        </p:nvSpPr>
+        <p:spPr>
+          <a:xfrm>
+            <a:off x="3246783" y="2690191"/>
+            <a:ext cx="1722782" cy="923330"/>
+          </a:xfrm>
+          <a:prstGeom prst="rect">
+            <a:avLst/>
+          </a:prstGeom>
+          <a:noFill/>
+        </p:spPr>
+        <p:txBody>
+          <a:bodyPr wrap="square" rtlCol="0">
+            <a:spAutoFit/>
+          </a:bodyPr>
+          <a:lstStyle/>
+          <a:p>
+            <a:r>
+              <a:rPr lang="en-US" dirty="0"/>
+              <a:t>Message Queue</a:t>
+            </a:r>
+          </a:p>
+          <a:p>
+            <a:r>
+              <a:rPr lang="en-US" dirty="0"/>
+              <a:t>(Kafka, RabbitMQ …)</a:t>
+            </a:r>
+            <a:endParaRPr lang="en-GB" dirty="0"/>
+          </a:p>
+        </p:txBody>
+      </p:sp>
+      <p:pic>
+        <p:nvPicPr>
+          <p:cNvPr id="21" name="Picture 20">
+            <a:extLst>
+              <a:ext uri="{FF2B5EF4-FFF2-40B4-BE49-F238E27FC236}">
+                <a16:creationId xmlns:a16="http://schemas.microsoft.com/office/drawing/2014/main" id="{03FE2262-81B5-46F6-8E42-BE215CDEFA31}"/>
+              </a:ext>
+            </a:extLst>
+          </p:cNvPr>
+          <p:cNvPicPr>
+            <a:picLocks noChangeAspect="1"/>
+          </p:cNvPicPr>
+          <p:nvPr/>
+        </p:nvPicPr>
+        <p:blipFill>
+          <a:blip r:embed="rId4"/>
+          <a:stretch>
+            <a:fillRect/>
+          </a:stretch>
+        </p:blipFill>
+        <p:spPr>
+          <a:xfrm>
+            <a:off x="5382493" y="874737"/>
+            <a:ext cx="1425286" cy="2825257"/>
+          </a:xfrm>
+          <a:prstGeom prst="rect">
+            <a:avLst/>
+          </a:prstGeom>
+        </p:spPr>
+      </p:pic>
+      <p:sp>
+        <p:nvSpPr>
+          <p:cNvPr id="22" name="Arrow: Right 21">
+            <a:extLst>
+              <a:ext uri="{FF2B5EF4-FFF2-40B4-BE49-F238E27FC236}">
+                <a16:creationId xmlns:a16="http://schemas.microsoft.com/office/drawing/2014/main" id="{D51749D4-BE40-407F-AE85-F032ABE3FFC4}"/>
+              </a:ext>
+            </a:extLst>
+          </p:cNvPr>
+          <p:cNvSpPr/>
+          <p:nvPr/>
+        </p:nvSpPr>
+        <p:spPr>
+          <a:xfrm>
+            <a:off x="4607073" y="2168096"/>
+            <a:ext cx="621676" cy="238538"/>
+          </a:xfrm>
+          <a:prstGeom prst="rightArrow">
+            <a:avLst/>
+          </a:prstGeom>
+        </p:spPr>
+        <p:style>
+          <a:lnRef idx="2">
+            <a:schemeClr val="accent1">
+              <a:shade val="50000"/>
+            </a:schemeClr>
+          </a:lnRef>
+          <a:fillRef idx="1">
+            <a:schemeClr val="accent1"/>
+          </a:fillRef>
+          <a:effectRef idx="0">
+            <a:schemeClr val="accent1"/>
+          </a:effectRef>
+          <a:fontRef idx="minor">
+            <a:schemeClr val="lt1"/>
+          </a:fontRef>
+        </p:style>
+        <p:txBody>
+          <a:bodyPr rtlCol="0" anchor="ctr"/>
+          <a:lstStyle/>
+          <a:p>
+            <a:pPr algn="ctr"/>
+            <a:endParaRPr lang="en-GB"/>
+          </a:p>
+        </p:txBody>
+      </p:sp>
+      <p:sp>
+        <p:nvSpPr>
+          <p:cNvPr id="24" name="TextBox 23">
+            <a:extLst>
+              <a:ext uri="{FF2B5EF4-FFF2-40B4-BE49-F238E27FC236}">
+                <a16:creationId xmlns:a16="http://schemas.microsoft.com/office/drawing/2014/main" id="{7A0FFAA6-4082-4597-8BFB-9B97200CE3B5}"/>
+              </a:ext>
+            </a:extLst>
+          </p:cNvPr>
+          <p:cNvSpPr txBox="1"/>
+          <p:nvPr/>
+        </p:nvSpPr>
+        <p:spPr>
+          <a:xfrm>
+            <a:off x="5228749" y="2690191"/>
+            <a:ext cx="1900922" cy="646331"/>
+          </a:xfrm>
+          <a:prstGeom prst="rect">
+            <a:avLst/>
+          </a:prstGeom>
+          <a:noFill/>
+        </p:spPr>
+        <p:txBody>
+          <a:bodyPr wrap="square" rtlCol="0">
+            <a:spAutoFit/>
+          </a:bodyPr>
+          <a:lstStyle/>
+          <a:p>
+            <a:r>
+              <a:rPr lang="en-US" dirty="0"/>
+              <a:t>Stream processing</a:t>
+            </a:r>
+          </a:p>
+          <a:p>
+            <a:r>
+              <a:rPr lang="en-US" dirty="0"/>
+              <a:t>(Spark, KSQL)</a:t>
+            </a:r>
+            <a:endParaRPr lang="en-GB" dirty="0"/>
+          </a:p>
+        </p:txBody>
+      </p:sp>
+      <p:pic>
+        <p:nvPicPr>
+          <p:cNvPr id="25" name="Picture 24">
+            <a:extLst>
+              <a:ext uri="{FF2B5EF4-FFF2-40B4-BE49-F238E27FC236}">
+                <a16:creationId xmlns:a16="http://schemas.microsoft.com/office/drawing/2014/main" id="{E768EF73-DCFA-4688-BEE0-91424E8478D2}"/>
+              </a:ext>
+            </a:extLst>
+          </p:cNvPr>
+          <p:cNvPicPr>
+            <a:picLocks noChangeAspect="1"/>
+          </p:cNvPicPr>
+          <p:nvPr/>
+        </p:nvPicPr>
+        <p:blipFill>
+          <a:blip r:embed="rId5"/>
+          <a:stretch>
+            <a:fillRect/>
+          </a:stretch>
+        </p:blipFill>
+        <p:spPr>
+          <a:xfrm>
+            <a:off x="7828010" y="1215937"/>
+            <a:ext cx="1780952" cy="2657143"/>
+          </a:xfrm>
+          <a:prstGeom prst="rect">
+            <a:avLst/>
+          </a:prstGeom>
+        </p:spPr>
+      </p:pic>
+      <p:sp>
+        <p:nvSpPr>
+          <p:cNvPr id="26" name="Arrow: Right 25">
+            <a:extLst>
+              <a:ext uri="{FF2B5EF4-FFF2-40B4-BE49-F238E27FC236}">
+                <a16:creationId xmlns:a16="http://schemas.microsoft.com/office/drawing/2014/main" id="{6A12C577-FF75-47E4-8B96-818CC6DAD7C7}"/>
+              </a:ext>
+            </a:extLst>
+          </p:cNvPr>
+          <p:cNvSpPr/>
+          <p:nvPr/>
+        </p:nvSpPr>
+        <p:spPr>
+          <a:xfrm>
+            <a:off x="7007056" y="2160104"/>
+            <a:ext cx="621676" cy="238538"/>
+          </a:xfrm>
+          <a:prstGeom prst="rightArrow">
+            <a:avLst/>
+          </a:prstGeom>
+        </p:spPr>
+        <p:style>
+          <a:lnRef idx="2">
+            <a:schemeClr val="accent1">
+              <a:shade val="50000"/>
+            </a:schemeClr>
+          </a:lnRef>
+          <a:fillRef idx="1">
+            <a:schemeClr val="accent1"/>
+          </a:fillRef>
+          <a:effectRef idx="0">
+            <a:schemeClr val="accent1"/>
+          </a:effectRef>
+          <a:fontRef idx="minor">
+            <a:schemeClr val="lt1"/>
+          </a:fontRef>
+        </p:style>
+        <p:txBody>
+          <a:bodyPr rtlCol="0" anchor="ctr"/>
+          <a:lstStyle/>
+          <a:p>
+            <a:pPr algn="ctr"/>
+            <a:endParaRPr lang="en-GB"/>
+          </a:p>
+        </p:txBody>
+      </p:sp>
+      <p:pic>
+        <p:nvPicPr>
+          <p:cNvPr id="28" name="Picture 27">
+            <a:extLst>
+              <a:ext uri="{FF2B5EF4-FFF2-40B4-BE49-F238E27FC236}">
+                <a16:creationId xmlns:a16="http://schemas.microsoft.com/office/drawing/2014/main" id="{238A6CB5-D115-48F8-86DF-22B0FE6E0C79}"/>
+              </a:ext>
+            </a:extLst>
+          </p:cNvPr>
+          <p:cNvPicPr>
+            <a:picLocks noChangeAspect="1"/>
+          </p:cNvPicPr>
+          <p:nvPr/>
+        </p:nvPicPr>
+        <p:blipFill>
+          <a:blip r:embed="rId6"/>
+          <a:stretch>
+            <a:fillRect/>
+          </a:stretch>
+        </p:blipFill>
+        <p:spPr>
+          <a:xfrm>
+            <a:off x="4607073" y="4133557"/>
+            <a:ext cx="2029746" cy="2029746"/>
+          </a:xfrm>
+          <a:prstGeom prst="rect">
+            <a:avLst/>
+          </a:prstGeom>
+        </p:spPr>
+      </p:pic>
+      <p:sp>
+        <p:nvSpPr>
+          <p:cNvPr id="29" name="Arrow: Right 28">
+            <a:extLst>
+              <a:ext uri="{FF2B5EF4-FFF2-40B4-BE49-F238E27FC236}">
+                <a16:creationId xmlns:a16="http://schemas.microsoft.com/office/drawing/2014/main" id="{C15075FE-E32A-42A6-8FEF-5900E848D0A0}"/>
+              </a:ext>
+            </a:extLst>
+          </p:cNvPr>
+          <p:cNvSpPr/>
+          <p:nvPr/>
+        </p:nvSpPr>
+        <p:spPr>
+          <a:xfrm rot="18910442" flipH="1">
+            <a:off x="6785635" y="4168744"/>
+            <a:ext cx="820954" cy="275764"/>
+          </a:xfrm>
+          <a:prstGeom prst="rightArrow">
+            <a:avLst/>
+          </a:prstGeom>
+        </p:spPr>
+        <p:style>
+          <a:lnRef idx="2">
+            <a:schemeClr val="accent1">
+              <a:shade val="50000"/>
+            </a:schemeClr>
+          </a:lnRef>
+          <a:fillRef idx="1">
+            <a:schemeClr val="accent1"/>
+          </a:fillRef>
+          <a:effectRef idx="0">
+            <a:schemeClr val="accent1"/>
+          </a:effectRef>
+          <a:fontRef idx="minor">
+            <a:schemeClr val="lt1"/>
+          </a:fontRef>
+        </p:style>
+        <p:txBody>
+          <a:bodyPr rtlCol="0" anchor="ctr"/>
+          <a:lstStyle/>
+          <a:p>
+            <a:pPr algn="ctr"/>
+            <a:endParaRPr lang="en-GB"/>
+          </a:p>
+        </p:txBody>
+      </p:sp>
+      <p:sp>
+        <p:nvSpPr>
+          <p:cNvPr id="31" name="Arrow: Right 30">
+            <a:extLst>
+              <a:ext uri="{FF2B5EF4-FFF2-40B4-BE49-F238E27FC236}">
+                <a16:creationId xmlns:a16="http://schemas.microsoft.com/office/drawing/2014/main" id="{14B57EC2-FE1F-46BA-9719-FE3E972DBF8B}"/>
+              </a:ext>
+            </a:extLst>
+          </p:cNvPr>
+          <p:cNvSpPr/>
+          <p:nvPr/>
+        </p:nvSpPr>
+        <p:spPr>
+          <a:xfrm rot="16200000" flipH="1">
+            <a:off x="5579606" y="3569742"/>
+            <a:ext cx="559875" cy="260506"/>
+          </a:xfrm>
+          <a:prstGeom prst="rightArrow">
+            <a:avLst/>
+          </a:prstGeom>
+        </p:spPr>
+        <p:style>
+          <a:lnRef idx="2">
+            <a:schemeClr val="accent1">
+              <a:shade val="50000"/>
+            </a:schemeClr>
+          </a:lnRef>
+          <a:fillRef idx="1">
+            <a:schemeClr val="accent1"/>
+          </a:fillRef>
+          <a:effectRef idx="0">
+            <a:schemeClr val="accent1"/>
+          </a:effectRef>
+          <a:fontRef idx="minor">
+            <a:schemeClr val="lt1"/>
+          </a:fontRef>
+        </p:style>
+        <p:txBody>
+          <a:bodyPr rtlCol="0" anchor="ctr"/>
+          <a:lstStyle/>
+          <a:p>
+            <a:pPr algn="ctr"/>
+            <a:endParaRPr lang="en-GB"/>
+          </a:p>
+        </p:txBody>
+      </p:sp>
+      <p:sp>
+        <p:nvSpPr>
+          <p:cNvPr id="33" name="TextBox 32">
+            <a:extLst>
+              <a:ext uri="{FF2B5EF4-FFF2-40B4-BE49-F238E27FC236}">
+                <a16:creationId xmlns:a16="http://schemas.microsoft.com/office/drawing/2014/main" id="{8623BE11-1AFB-4AC0-A51C-3E3F1C6474FF}"/>
+              </a:ext>
+            </a:extLst>
+          </p:cNvPr>
+          <p:cNvSpPr txBox="1"/>
+          <p:nvPr/>
+        </p:nvSpPr>
+        <p:spPr>
+          <a:xfrm>
+            <a:off x="4227443" y="6163303"/>
+            <a:ext cx="4435139" cy="369332"/>
+          </a:xfrm>
+          <a:prstGeom prst="rect">
+            <a:avLst/>
+          </a:prstGeom>
+          <a:noFill/>
+        </p:spPr>
+        <p:txBody>
+          <a:bodyPr wrap="square" rtlCol="0">
+            <a:spAutoFit/>
+          </a:bodyPr>
+          <a:lstStyle/>
+          <a:p>
+            <a:r>
+              <a:rPr lang="en-US" dirty="0"/>
+              <a:t>Zeppelin,</a:t>
+            </a:r>
+            <a:r>
+              <a:rPr lang="fr-FR" dirty="0"/>
+              <a:t> Tableau, </a:t>
+            </a:r>
+            <a:r>
+              <a:rPr lang="fr-FR" dirty="0" err="1"/>
+              <a:t>Jupyter</a:t>
+            </a:r>
+            <a:r>
+              <a:rPr lang="fr-FR" dirty="0"/>
+              <a:t>, </a:t>
+            </a:r>
+            <a:r>
+              <a:rPr lang="fr-FR" dirty="0" err="1"/>
+              <a:t>Plotly</a:t>
+            </a:r>
+            <a:r>
+              <a:rPr lang="fr-FR" dirty="0"/>
+              <a:t>, </a:t>
+            </a:r>
+            <a:r>
+              <a:rPr lang="fr-FR" dirty="0" err="1"/>
+              <a:t>Kibana</a:t>
+            </a:r>
+            <a:r>
+              <a:rPr lang="fr-FR" dirty="0"/>
+              <a:t> …</a:t>
+            </a:r>
+            <a:endParaRPr lang="en-GB" dirty="0"/>
+          </a:p>
+        </p:txBody>
+      </p:sp>
+    </p:spTree>
+    <p:extLst>
+      <p:ext uri="{BB962C8B-B14F-4D97-AF65-F5344CB8AC3E}">
+        <p14:creationId xmlns:p14="http://schemas.microsoft.com/office/powerpoint/2010/main" val="3310120127"/>
+      </p:ext>
+    </p:extLst>
+  </p:cSld>
+  <p:clrMapOvr>
+    <a:masterClrMapping/>
+  </p:clrMapOvr>
+</p:sld>
+</file>
+
+<file path=ppt/slides/slide8.xml><?xml version="1.0" encoding="utf-8"?>
+<p:sld xmlns:a="http://schemas.openxmlformats.org/drawingml/2006/main" xmlns:r="http://schemas.openxmlformats.org/officeDocument/2006/relationships" xmlns:p="http://schemas.openxmlformats.org/presentationml/2006/main">
+  <p:cSld>
+    <p:spTree>
+      <p:nvGrpSpPr>
+        <p:cNvPr id="1" name=""/>
+        <p:cNvGrpSpPr/>
+        <p:nvPr/>
+      </p:nvGrpSpPr>
+      <p:grpSpPr>
+        <a:xfrm>
+          <a:off x="0" y="0"/>
+          <a:ext cx="0" cy="0"/>
+          <a:chOff x="0" y="0"/>
+          <a:chExt cx="0" cy="0"/>
+        </a:xfrm>
+      </p:grpSpPr>
+      <p:sp>
+        <p:nvSpPr>
+          <p:cNvPr id="14" name="Rectangle 13">
+            <a:extLst>
+              <a:ext uri="{FF2B5EF4-FFF2-40B4-BE49-F238E27FC236}">
+                <a16:creationId xmlns:a16="http://schemas.microsoft.com/office/drawing/2014/main" id="{3E8603B0-C771-45BF-A1B4-EAE4D0917BDA}"/>
+              </a:ext>
+            </a:extLst>
+          </p:cNvPr>
+          <p:cNvSpPr/>
+          <p:nvPr/>
+        </p:nvSpPr>
+        <p:spPr>
+          <a:xfrm>
+            <a:off x="5866997" y="2135031"/>
+            <a:ext cx="1705378" cy="2704272"/>
+          </a:xfrm>
+          <a:prstGeom prst="rect">
+            <a:avLst/>
+          </a:prstGeom>
+          <a:noFill/>
+        </p:spPr>
+        <p:style>
+          <a:lnRef idx="2">
+            <a:schemeClr val="accent1">
+              <a:shade val="50000"/>
+            </a:schemeClr>
+          </a:lnRef>
+          <a:fillRef idx="1">
+            <a:schemeClr val="accent1"/>
+          </a:fillRef>
+          <a:effectRef idx="0">
+            <a:schemeClr val="accent1"/>
+          </a:effectRef>
+          <a:fontRef idx="minor">
+            <a:schemeClr val="lt1"/>
+          </a:fontRef>
+        </p:style>
+        <p:txBody>
+          <a:bodyPr rtlCol="0" anchor="ctr"/>
+          <a:lstStyle/>
+          <a:p>
+            <a:pPr algn="ctr"/>
+            <a:endParaRPr lang="en-GB" dirty="0"/>
+          </a:p>
+        </p:txBody>
+      </p:sp>
+      <p:sp>
+        <p:nvSpPr>
+          <p:cNvPr id="2" name="Title 1">
+            <a:extLst>
+              <a:ext uri="{FF2B5EF4-FFF2-40B4-BE49-F238E27FC236}">
+                <a16:creationId xmlns:a16="http://schemas.microsoft.com/office/drawing/2014/main" id="{A6E098CB-2AD7-4541-BC90-8FCF56060041}"/>
+              </a:ext>
+            </a:extLst>
+          </p:cNvPr>
+          <p:cNvSpPr>
+            <a:spLocks noGrp="1"/>
+          </p:cNvSpPr>
+          <p:nvPr>
+            <p:ph type="title"/>
+          </p:nvPr>
+        </p:nvSpPr>
+        <p:spPr/>
+        <p:txBody>
+          <a:bodyPr/>
+          <a:lstStyle/>
+          <a:p>
+            <a:r>
+              <a:rPr lang="en-US" dirty="0"/>
+              <a:t>Cart Producer</a:t>
+            </a:r>
+          </a:p>
+        </p:txBody>
+      </p:sp>
+      <p:sp>
+        <p:nvSpPr>
+          <p:cNvPr id="3" name="Footer Placeholder 2">
+            <a:extLst>
+              <a:ext uri="{FF2B5EF4-FFF2-40B4-BE49-F238E27FC236}">
+                <a16:creationId xmlns:a16="http://schemas.microsoft.com/office/drawing/2014/main" id="{AACB0A2C-4D94-B041-89D6-8322F8E87E8D}"/>
+              </a:ext>
+            </a:extLst>
+          </p:cNvPr>
+          <p:cNvSpPr>
+            <a:spLocks noGrp="1"/>
+          </p:cNvSpPr>
+          <p:nvPr>
+            <p:ph type="ftr" sz="quarter" idx="10"/>
+          </p:nvPr>
+        </p:nvSpPr>
+        <p:spPr/>
+        <p:txBody>
+          <a:bodyPr/>
+          <a:lstStyle/>
+          <a:p>
+            <a:r>
+              <a:rPr lang="en-US" noProof="0"/>
+              <a:t>Add a footer</a:t>
+            </a:r>
+            <a:endParaRPr lang="en-US" noProof="0" dirty="0"/>
+          </a:p>
+        </p:txBody>
+      </p:sp>
+      <p:sp>
+        <p:nvSpPr>
+          <p:cNvPr id="4" name="Slide Number Placeholder 3">
+            <a:extLst>
+              <a:ext uri="{FF2B5EF4-FFF2-40B4-BE49-F238E27FC236}">
+                <a16:creationId xmlns:a16="http://schemas.microsoft.com/office/drawing/2014/main" id="{B24F5695-E14A-294F-85B4-1AF9CA76A11D}"/>
+              </a:ext>
+            </a:extLst>
+          </p:cNvPr>
+          <p:cNvSpPr>
+            <a:spLocks noGrp="1"/>
+          </p:cNvSpPr>
+          <p:nvPr>
+            <p:ph type="sldNum" sz="quarter" idx="11"/>
+          </p:nvPr>
+        </p:nvSpPr>
+        <p:spPr/>
+        <p:txBody>
+          <a:bodyPr/>
+          <a:lstStyle/>
+          <a:p>
+            <a:fld id="{8699F50C-BE38-4BD0-BA84-9B090E1F2B9B}" type="slidenum">
+              <a:rPr lang="en-US" noProof="0" smtClean="0"/>
+              <a:t>8</a:t>
+            </a:fld>
+            <a:endParaRPr lang="en-US" noProof="0" dirty="0"/>
+          </a:p>
+        </p:txBody>
+      </p:sp>
+      <p:pic>
+        <p:nvPicPr>
+          <p:cNvPr id="5" name="Picture 4">
+            <a:extLst>
+              <a:ext uri="{FF2B5EF4-FFF2-40B4-BE49-F238E27FC236}">
+                <a16:creationId xmlns:a16="http://schemas.microsoft.com/office/drawing/2014/main" id="{659E0209-AFCC-4C6F-B0DB-ACC8040D5DE2}"/>
+              </a:ext>
+            </a:extLst>
+          </p:cNvPr>
+          <p:cNvPicPr>
+            <a:picLocks noChangeAspect="1"/>
+          </p:cNvPicPr>
+          <p:nvPr/>
+        </p:nvPicPr>
+        <p:blipFill>
+          <a:blip r:embed="rId2"/>
+          <a:stretch>
+            <a:fillRect/>
+          </a:stretch>
+        </p:blipFill>
+        <p:spPr>
+          <a:xfrm>
+            <a:off x="2976128" y="2380182"/>
+            <a:ext cx="2062632" cy="2062632"/>
+          </a:xfrm>
+          <a:prstGeom prst="rect">
+            <a:avLst/>
+          </a:prstGeom>
+        </p:spPr>
+      </p:pic>
+      <p:sp>
+        <p:nvSpPr>
+          <p:cNvPr id="6" name="TextBox 5">
+            <a:extLst>
+              <a:ext uri="{FF2B5EF4-FFF2-40B4-BE49-F238E27FC236}">
+                <a16:creationId xmlns:a16="http://schemas.microsoft.com/office/drawing/2014/main" id="{82348CF8-490A-4F6F-AEEB-333E066EF6EE}"/>
+              </a:ext>
+            </a:extLst>
+          </p:cNvPr>
+          <p:cNvSpPr txBox="1"/>
+          <p:nvPr/>
+        </p:nvSpPr>
+        <p:spPr>
+          <a:xfrm>
+            <a:off x="3267163" y="4442814"/>
+            <a:ext cx="1837345" cy="646331"/>
+          </a:xfrm>
+          <a:prstGeom prst="rect">
+            <a:avLst/>
+          </a:prstGeom>
+          <a:noFill/>
+        </p:spPr>
+        <p:txBody>
+          <a:bodyPr wrap="square" rtlCol="0">
+            <a:spAutoFit/>
+          </a:bodyPr>
+          <a:lstStyle/>
+          <a:p>
+            <a:r>
+              <a:rPr lang="en-US" dirty="0"/>
+              <a:t>E-commerce simulator</a:t>
+            </a:r>
+            <a:endParaRPr lang="en-GB" dirty="0"/>
+          </a:p>
+        </p:txBody>
+      </p:sp>
+      <p:pic>
+        <p:nvPicPr>
+          <p:cNvPr id="7" name="Picture 6">
+            <a:extLst>
+              <a:ext uri="{FF2B5EF4-FFF2-40B4-BE49-F238E27FC236}">
+                <a16:creationId xmlns:a16="http://schemas.microsoft.com/office/drawing/2014/main" id="{A9A6A236-5947-4B16-878B-E3960D5E5499}"/>
+              </a:ext>
+            </a:extLst>
+          </p:cNvPr>
+          <p:cNvPicPr>
+            <a:picLocks noChangeAspect="1"/>
+          </p:cNvPicPr>
+          <p:nvPr/>
+        </p:nvPicPr>
+        <p:blipFill>
+          <a:blip r:embed="rId3"/>
+          <a:stretch>
+            <a:fillRect/>
+          </a:stretch>
+        </p:blipFill>
+        <p:spPr>
+          <a:xfrm>
+            <a:off x="6199882" y="2470067"/>
+            <a:ext cx="942857" cy="514286"/>
+          </a:xfrm>
+          <a:prstGeom prst="rect">
+            <a:avLst/>
+          </a:prstGeom>
+        </p:spPr>
+      </p:pic>
+      <p:pic>
+        <p:nvPicPr>
+          <p:cNvPr id="8" name="Picture 7">
+            <a:extLst>
+              <a:ext uri="{FF2B5EF4-FFF2-40B4-BE49-F238E27FC236}">
+                <a16:creationId xmlns:a16="http://schemas.microsoft.com/office/drawing/2014/main" id="{ED0EFFD2-721A-44F2-957C-78E06433E530}"/>
+              </a:ext>
+            </a:extLst>
+          </p:cNvPr>
+          <p:cNvPicPr>
+            <a:picLocks noChangeAspect="1"/>
+          </p:cNvPicPr>
+          <p:nvPr/>
+        </p:nvPicPr>
+        <p:blipFill>
+          <a:blip r:embed="rId3"/>
+          <a:stretch>
+            <a:fillRect/>
+          </a:stretch>
+        </p:blipFill>
+        <p:spPr>
+          <a:xfrm>
+            <a:off x="6199881" y="3724948"/>
+            <a:ext cx="942857" cy="514286"/>
+          </a:xfrm>
+          <a:prstGeom prst="rect">
+            <a:avLst/>
+          </a:prstGeom>
+        </p:spPr>
+      </p:pic>
+      <p:sp>
+        <p:nvSpPr>
+          <p:cNvPr id="9" name="TextBox 8">
+            <a:extLst>
+              <a:ext uri="{FF2B5EF4-FFF2-40B4-BE49-F238E27FC236}">
+                <a16:creationId xmlns:a16="http://schemas.microsoft.com/office/drawing/2014/main" id="{F6A1A5E4-0E61-4FDA-B6EC-160561CB9AE0}"/>
+              </a:ext>
+            </a:extLst>
+          </p:cNvPr>
+          <p:cNvSpPr txBox="1"/>
+          <p:nvPr/>
+        </p:nvSpPr>
+        <p:spPr>
+          <a:xfrm>
+            <a:off x="6199881" y="2984353"/>
+            <a:ext cx="1146958" cy="369332"/>
+          </a:xfrm>
+          <a:prstGeom prst="rect">
+            <a:avLst/>
+          </a:prstGeom>
+          <a:noFill/>
+        </p:spPr>
+        <p:txBody>
+          <a:bodyPr wrap="square" rtlCol="0">
+            <a:spAutoFit/>
+          </a:bodyPr>
+          <a:lstStyle/>
+          <a:p>
+            <a:r>
+              <a:rPr lang="en-US" dirty="0"/>
+              <a:t>Cart topic</a:t>
+            </a:r>
+            <a:endParaRPr lang="en-GB" dirty="0"/>
+          </a:p>
+        </p:txBody>
+      </p:sp>
+      <p:sp>
+        <p:nvSpPr>
+          <p:cNvPr id="10" name="TextBox 9">
+            <a:extLst>
+              <a:ext uri="{FF2B5EF4-FFF2-40B4-BE49-F238E27FC236}">
+                <a16:creationId xmlns:a16="http://schemas.microsoft.com/office/drawing/2014/main" id="{3FE861D4-835E-4EAA-9AF5-AE7604712922}"/>
+              </a:ext>
+            </a:extLst>
+          </p:cNvPr>
+          <p:cNvSpPr txBox="1"/>
+          <p:nvPr/>
+        </p:nvSpPr>
+        <p:spPr>
+          <a:xfrm>
+            <a:off x="5951710" y="4241165"/>
+            <a:ext cx="1510747" cy="369332"/>
+          </a:xfrm>
+          <a:prstGeom prst="rect">
+            <a:avLst/>
+          </a:prstGeom>
+          <a:noFill/>
+        </p:spPr>
+        <p:txBody>
+          <a:bodyPr wrap="square" rtlCol="0">
+            <a:spAutoFit/>
+          </a:bodyPr>
+          <a:lstStyle/>
+          <a:p>
+            <a:r>
+              <a:rPr lang="en-US" dirty="0"/>
+              <a:t>shipping topic</a:t>
+            </a:r>
+            <a:endParaRPr lang="en-GB" dirty="0"/>
+          </a:p>
+        </p:txBody>
+      </p:sp>
+      <p:sp>
+        <p:nvSpPr>
+          <p:cNvPr id="11" name="Arrow: Right 10">
+            <a:extLst>
+              <a:ext uri="{FF2B5EF4-FFF2-40B4-BE49-F238E27FC236}">
+                <a16:creationId xmlns:a16="http://schemas.microsoft.com/office/drawing/2014/main" id="{D5F49183-8157-4067-ADD2-07C12A46263C}"/>
+              </a:ext>
+            </a:extLst>
+          </p:cNvPr>
+          <p:cNvSpPr/>
+          <p:nvPr/>
+        </p:nvSpPr>
+        <p:spPr>
+          <a:xfrm rot="20267801">
+            <a:off x="5142497" y="2948965"/>
+            <a:ext cx="621676" cy="238538"/>
+          </a:xfrm>
+          <a:prstGeom prst="rightArrow">
+            <a:avLst/>
+          </a:prstGeom>
+        </p:spPr>
+        <p:style>
+          <a:lnRef idx="2">
+            <a:schemeClr val="accent1">
+              <a:shade val="50000"/>
+            </a:schemeClr>
+          </a:lnRef>
+          <a:fillRef idx="1">
+            <a:schemeClr val="accent1"/>
+          </a:fillRef>
+          <a:effectRef idx="0">
+            <a:schemeClr val="accent1"/>
+          </a:effectRef>
+          <a:fontRef idx="minor">
+            <a:schemeClr val="lt1"/>
+          </a:fontRef>
+        </p:style>
+        <p:txBody>
+          <a:bodyPr rtlCol="0" anchor="ctr"/>
+          <a:lstStyle/>
+          <a:p>
+            <a:pPr algn="ctr"/>
+            <a:endParaRPr lang="en-GB"/>
+          </a:p>
+        </p:txBody>
+      </p:sp>
+      <p:sp>
+        <p:nvSpPr>
+          <p:cNvPr id="12" name="Arrow: Right 11">
+            <a:extLst>
+              <a:ext uri="{FF2B5EF4-FFF2-40B4-BE49-F238E27FC236}">
+                <a16:creationId xmlns:a16="http://schemas.microsoft.com/office/drawing/2014/main" id="{5C8FBF0A-7C4E-4D4B-A4CD-11060484600E}"/>
+              </a:ext>
+            </a:extLst>
+          </p:cNvPr>
+          <p:cNvSpPr/>
+          <p:nvPr/>
+        </p:nvSpPr>
+        <p:spPr>
+          <a:xfrm rot="1175293">
+            <a:off x="5126508" y="3628169"/>
+            <a:ext cx="621676" cy="238555"/>
+          </a:xfrm>
+          <a:prstGeom prst="rightArrow">
+            <a:avLst/>
+          </a:prstGeom>
+        </p:spPr>
+        <p:style>
+          <a:lnRef idx="2">
+            <a:schemeClr val="accent1">
+              <a:shade val="50000"/>
+            </a:schemeClr>
+          </a:lnRef>
+          <a:fillRef idx="1">
+            <a:schemeClr val="accent1"/>
+          </a:fillRef>
+          <a:effectRef idx="0">
+            <a:schemeClr val="accent1"/>
+          </a:effectRef>
+          <a:fontRef idx="minor">
+            <a:schemeClr val="lt1"/>
+          </a:fontRef>
+        </p:style>
+        <p:txBody>
+          <a:bodyPr rtlCol="0" anchor="ctr"/>
+          <a:lstStyle/>
+          <a:p>
+            <a:pPr algn="ctr"/>
+            <a:endParaRPr lang="en-GB"/>
+          </a:p>
+        </p:txBody>
+      </p:sp>
+      <p:sp>
+        <p:nvSpPr>
+          <p:cNvPr id="15" name="TextBox 14">
+            <a:extLst>
+              <a:ext uri="{FF2B5EF4-FFF2-40B4-BE49-F238E27FC236}">
+                <a16:creationId xmlns:a16="http://schemas.microsoft.com/office/drawing/2014/main" id="{8BC10ACC-DAD7-41E2-992A-E1EBD74EB4BD}"/>
+              </a:ext>
+            </a:extLst>
+          </p:cNvPr>
+          <p:cNvSpPr txBox="1"/>
+          <p:nvPr/>
+        </p:nvSpPr>
+        <p:spPr>
+          <a:xfrm>
+            <a:off x="6242626" y="4896644"/>
+            <a:ext cx="900112" cy="369332"/>
+          </a:xfrm>
+          <a:prstGeom prst="rect">
+            <a:avLst/>
+          </a:prstGeom>
+          <a:noFill/>
+        </p:spPr>
+        <p:txBody>
+          <a:bodyPr wrap="square" rtlCol="0">
+            <a:spAutoFit/>
+          </a:bodyPr>
+          <a:lstStyle/>
+          <a:p>
+            <a:r>
+              <a:rPr lang="en-US" dirty="0"/>
+              <a:t>Kafka</a:t>
+            </a:r>
+            <a:endParaRPr lang="en-GB" dirty="0"/>
           </a:p>
         </p:txBody>
       </p:sp>
@@ -14599,7 +15654,7 @@
 </p:sld>
 </file>
 
-<file path=ppt/slides/slide8.xml><?xml version="1.0" encoding="utf-8"?>
+<file path=ppt/slides/slide9.xml><?xml version="1.0" encoding="utf-8"?>
 <p:sld xmlns:a="http://schemas.openxmlformats.org/drawingml/2006/main" xmlns:r="http://schemas.openxmlformats.org/officeDocument/2006/relationships" xmlns:p="http://schemas.openxmlformats.org/presentationml/2006/main">
   <p:cSld>
     <p:spTree>
@@ -15758,23 +16813,6 @@
 </file>
 
 <file path=customXml/item1.xml><?xml version="1.0" encoding="utf-8"?>
-<p:properties xmlns:p="http://schemas.microsoft.com/office/2006/metadata/properties" xmlns:xsi="http://www.w3.org/2001/XMLSchema-instance" xmlns:pc="http://schemas.microsoft.com/office/infopath/2007/PartnerControls">
-  <documentManagement>
-    <MediaServiceKeyPoints xmlns="71af3243-3dd4-4a8d-8c0d-dd76da1f02a5" xsi:nil="true"/>
-  </documentManagement>
-</p:properties>
-</file>
-
-<file path=customXml/item2.xml><?xml version="1.0" encoding="utf-8"?>
-<?mso-contentType ?>
-<FormTemplates xmlns="http://schemas.microsoft.com/sharepoint/v3/contenttype/forms">
-  <Display>DocumentLibraryForm</Display>
-  <Edit>DocumentLibraryForm</Edit>
-  <New>DocumentLibraryForm</New>
-</FormTemplates>
-</file>
-
-<file path=customXml/item3.xml><?xml version="1.0" encoding="utf-8"?>
 <ct:contentTypeSchema xmlns:ct="http://schemas.microsoft.com/office/2006/metadata/contentType" xmlns:ma="http://schemas.microsoft.com/office/2006/metadata/properties/metaAttributes" ct:_="" ma:_="" ma:contentTypeName="Document" ma:contentTypeID="0x01010079F111ED35F8CC479449609E8A0923A6" ma:contentTypeVersion="11" ma:contentTypeDescription="Create a new document." ma:contentTypeScope="" ma:versionID="96291512c1ee715ab617f4c07df79fc1">
   <xsd:schema xmlns:xsd="http://www.w3.org/2001/XMLSchema" xmlns:xs="http://www.w3.org/2001/XMLSchema" xmlns:p="http://schemas.microsoft.com/office/2006/metadata/properties" xmlns:ns2="71af3243-3dd4-4a8d-8c0d-dd76da1f02a5" xmlns:ns3="16c05727-aa75-4e4a-9b5f-8a80a1165891" targetNamespace="http://schemas.microsoft.com/office/2006/metadata/properties" ma:root="true" ma:fieldsID="8256c27c40ca5c40ce1cf6c44f0205df" ns2:_="" ns3:_="">
     <xsd:import namespace="71af3243-3dd4-4a8d-8c0d-dd76da1f02a5"/>
@@ -15985,25 +17023,24 @@
 </ct:contentTypeSchema>
 </file>
 
-<file path=customXml/itemProps1.xml><?xml version="1.0" encoding="utf-8"?>
-<ds:datastoreItem xmlns:ds="http://schemas.openxmlformats.org/officeDocument/2006/customXml" ds:itemID="{C87F4215-C6BB-44A3-9A5E-9446E6835900}">
-  <ds:schemaRefs>
-    <ds:schemaRef ds:uri="http://schemas.microsoft.com/office/2006/metadata/properties"/>
-    <ds:schemaRef ds:uri="http://schemas.microsoft.com/office/infopath/2007/PartnerControls"/>
-    <ds:schemaRef ds:uri="71af3243-3dd4-4a8d-8c0d-dd76da1f02a5"/>
-  </ds:schemaRefs>
-</ds:datastoreItem>
+<file path=customXml/item2.xml><?xml version="1.0" encoding="utf-8"?>
+<?mso-contentType ?>
+<FormTemplates xmlns="http://schemas.microsoft.com/sharepoint/v3/contenttype/forms">
+  <Display>DocumentLibraryForm</Display>
+  <Edit>DocumentLibraryForm</Edit>
+  <New>DocumentLibraryForm</New>
+</FormTemplates>
 </file>
 
-<file path=customXml/itemProps2.xml><?xml version="1.0" encoding="utf-8"?>
-<ds:datastoreItem xmlns:ds="http://schemas.openxmlformats.org/officeDocument/2006/customXml" ds:itemID="{A80A5AF1-8C57-4290-936E-5FD27C957251}">
-  <ds:schemaRefs>
-    <ds:schemaRef ds:uri="http://schemas.microsoft.com/sharepoint/v3/contenttype/forms"/>
-  </ds:schemaRefs>
-</ds:datastoreItem>
+<file path=customXml/item3.xml><?xml version="1.0" encoding="utf-8"?>
+<p:properties xmlns:p="http://schemas.microsoft.com/office/2006/metadata/properties" xmlns:xsi="http://www.w3.org/2001/XMLSchema-instance" xmlns:pc="http://schemas.microsoft.com/office/infopath/2007/PartnerControls">
+  <documentManagement>
+    <MediaServiceKeyPoints xmlns="71af3243-3dd4-4a8d-8c0d-dd76da1f02a5" xsi:nil="true"/>
+  </documentManagement>
+</p:properties>
 </file>
 
-<file path=customXml/itemProps3.xml><?xml version="1.0" encoding="utf-8"?>
+<file path=customXml/itemProps1.xml><?xml version="1.0" encoding="utf-8"?>
 <ds:datastoreItem xmlns:ds="http://schemas.openxmlformats.org/officeDocument/2006/customXml" ds:itemID="{8F8919DE-9BD9-47A9-9F5D-16EBB9687974}">
   <ds:schemaRefs>
     <ds:schemaRef ds:uri="http://schemas.microsoft.com/office/2006/metadata/contentType"/>
@@ -16020,4 +17057,22 @@
     <ds:schemaRef ds:uri="http://schemas.microsoft.com/internal/obd"/>
   </ds:schemaRefs>
 </ds:datastoreItem>
+</file>
+
+<file path=customXml/itemProps2.xml><?xml version="1.0" encoding="utf-8"?>
+<ds:datastoreItem xmlns:ds="http://schemas.openxmlformats.org/officeDocument/2006/customXml" ds:itemID="{A80A5AF1-8C57-4290-936E-5FD27C957251}">
+  <ds:schemaRefs>
+    <ds:schemaRef ds:uri="http://schemas.microsoft.com/sharepoint/v3/contenttype/forms"/>
+  </ds:schemaRefs>
+</ds:datastoreItem>
+</file>
+
+<file path=customXml/itemProps3.xml><?xml version="1.0" encoding="utf-8"?>
+<ds:datastoreItem xmlns:ds="http://schemas.openxmlformats.org/officeDocument/2006/customXml" ds:itemID="{C87F4215-C6BB-44A3-9A5E-9446E6835900}">
+  <ds:schemaRefs>
+    <ds:schemaRef ds:uri="http://schemas.microsoft.com/office/2006/metadata/properties"/>
+    <ds:schemaRef ds:uri="http://schemas.microsoft.com/office/infopath/2007/PartnerControls"/>
+    <ds:schemaRef ds:uri="71af3243-3dd4-4a8d-8c0d-dd76da1f02a5"/>
+  </ds:schemaRefs>
+</ds:datastoreItem>
 </file>
</xml_diff>